<commit_message>
mise à jour présentaiton
</commit_message>
<xml_diff>
--- a/0_diversRapport/2_presentation_finale/presentation.pptx
+++ b/0_diversRapport/2_presentation_finale/presentation.pptx
@@ -3197,7 +3197,7 @@
           <a:p>
             <a:fld id="{B1CFD530-74E2-4C2F-9466-E54C35C78BB2}" type="datetimeFigureOut">
               <a:rPr lang="fr-CH" smtClean="0"/>
-              <a:t>20.01.2023</a:t>
+              <a:t>21.01.2023</a:t>
             </a:fld>
             <a:endParaRPr lang="fr-CH"/>
           </a:p>
@@ -3374,7 +3374,7 @@
           <a:p>
             <a:fld id="{3B32B2E6-3C9D-4BF5-A0C8-422AAE39B13D}" type="datetimeFigureOut">
               <a:rPr lang="fr-CH" smtClean="0"/>
-              <a:t>20.01.2023</a:t>
+              <a:t>21.01.2023</a:t>
             </a:fld>
             <a:endParaRPr lang="fr-CH"/>
           </a:p>
@@ -3959,7 +3959,7 @@
           <a:p>
             <a:fld id="{C1682818-E5D2-432F-B2F9-8E21E22AAF34}" type="datetime1">
               <a:rPr lang="fr-CH" smtClean="0"/>
-              <a:t>20.01.2023</a:t>
+              <a:t>21.01.2023</a:t>
             </a:fld>
             <a:endParaRPr lang="fr-CH"/>
           </a:p>
@@ -4159,7 +4159,7 @@
           <a:p>
             <a:fld id="{CB7874FF-FDDF-43E7-B3B1-EE286775C590}" type="datetime1">
               <a:rPr lang="fr-CH" smtClean="0"/>
-              <a:t>20.01.2023</a:t>
+              <a:t>21.01.2023</a:t>
             </a:fld>
             <a:endParaRPr lang="fr-CH"/>
           </a:p>
@@ -4369,7 +4369,7 @@
           <a:p>
             <a:fld id="{138AED7B-2485-4213-89F2-0AC4EA1555BA}" type="datetime1">
               <a:rPr lang="fr-CH" smtClean="0"/>
-              <a:t>20.01.2023</a:t>
+              <a:t>21.01.2023</a:t>
             </a:fld>
             <a:endParaRPr lang="fr-CH"/>
           </a:p>
@@ -4574,7 +4574,7 @@
           <a:p>
             <a:fld id="{2320262B-2CF3-4F76-87D6-AD190785F2F6}" type="datetime1">
               <a:rPr lang="fr-CH" smtClean="0"/>
-              <a:t>20.01.2023</a:t>
+              <a:t>21.01.2023</a:t>
             </a:fld>
             <a:endParaRPr lang="fr-CH"/>
           </a:p>
@@ -4850,7 +4850,7 @@
           <a:p>
             <a:fld id="{F0E20193-938C-4839-84F3-AB677F83AD38}" type="datetime1">
               <a:rPr lang="fr-CH" smtClean="0"/>
-              <a:t>20.01.2023</a:t>
+              <a:t>21.01.2023</a:t>
             </a:fld>
             <a:endParaRPr lang="fr-CH"/>
           </a:p>
@@ -5118,7 +5118,7 @@
           <a:p>
             <a:fld id="{AA4B60EC-B2B1-4EAE-BD21-AF8AC2B777C5}" type="datetime1">
               <a:rPr lang="fr-CH" smtClean="0"/>
-              <a:t>20.01.2023</a:t>
+              <a:t>21.01.2023</a:t>
             </a:fld>
             <a:endParaRPr lang="fr-CH"/>
           </a:p>
@@ -5533,7 +5533,7 @@
           <a:p>
             <a:fld id="{0664991D-E5FB-441B-BBB4-EE4CAE2497E2}" type="datetime1">
               <a:rPr lang="fr-CH" smtClean="0"/>
-              <a:t>20.01.2023</a:t>
+              <a:t>21.01.2023</a:t>
             </a:fld>
             <a:endParaRPr lang="fr-CH"/>
           </a:p>
@@ -5676,7 +5676,7 @@
           <a:p>
             <a:fld id="{EC9DEBB2-A1DA-4852-AED8-A243B07CE02C}" type="datetime1">
               <a:rPr lang="fr-CH" smtClean="0"/>
-              <a:t>20.01.2023</a:t>
+              <a:t>21.01.2023</a:t>
             </a:fld>
             <a:endParaRPr lang="fr-CH"/>
           </a:p>
@@ -5789,7 +5789,7 @@
           <a:p>
             <a:fld id="{1907F4B3-0DF6-4739-94B8-8957B1BDD2D1}" type="datetime1">
               <a:rPr lang="fr-CH" smtClean="0"/>
-              <a:t>20.01.2023</a:t>
+              <a:t>21.01.2023</a:t>
             </a:fld>
             <a:endParaRPr lang="fr-CH"/>
           </a:p>
@@ -6102,7 +6102,7 @@
           <a:p>
             <a:fld id="{F4F5DA3B-5D80-47C4-A2C8-3AA7E5B6577E}" type="datetime1">
               <a:rPr lang="fr-CH" smtClean="0"/>
-              <a:t>20.01.2023</a:t>
+              <a:t>21.01.2023</a:t>
             </a:fld>
             <a:endParaRPr lang="fr-CH"/>
           </a:p>
@@ -6391,7 +6391,7 @@
           <a:p>
             <a:fld id="{D31FD2C5-2557-47D5-8E02-CC731A7D766A}" type="datetime1">
               <a:rPr lang="fr-CH" smtClean="0"/>
-              <a:t>20.01.2023</a:t>
+              <a:t>21.01.2023</a:t>
             </a:fld>
             <a:endParaRPr lang="fr-CH"/>
           </a:p>
@@ -6634,7 +6634,7 @@
           <a:p>
             <a:fld id="{0664991D-E5FB-441B-BBB4-EE4CAE2497E2}" type="datetime1">
               <a:rPr lang="fr-CH" smtClean="0"/>
-              <a:t>20.01.2023</a:t>
+              <a:t>21.01.2023</a:t>
             </a:fld>
             <a:endParaRPr lang="fr-CH"/>
           </a:p>
@@ -7309,7 +7309,7 @@
                   <a:spcPts val="600"/>
                 </a:spcAft>
               </a:pPr>
-              <a:t>20.01.2023</a:t>
+              <a:t>21.01.2023</a:t>
             </a:fld>
             <a:endParaRPr lang="fr-CH">
               <a:solidFill>
@@ -7479,7 +7479,7 @@
           <a:p>
             <a:fld id="{2320262B-2CF3-4F76-87D6-AD190785F2F6}" type="datetime1">
               <a:rPr lang="fr-CH" smtClean="0"/>
-              <a:t>20.01.2023</a:t>
+              <a:t>21.01.2023</a:t>
             </a:fld>
             <a:endParaRPr lang="fr-CH"/>
           </a:p>
@@ -7536,8 +7536,8 @@
         </p:blipFill>
         <p:spPr>
           <a:xfrm>
-            <a:off x="5173900" y="2838399"/>
-            <a:ext cx="1844200" cy="1181202"/>
+            <a:off x="4562168" y="2620452"/>
+            <a:ext cx="2524758" cy="1617096"/>
           </a:xfrm>
           <a:prstGeom prst="rect">
             <a:avLst/>
@@ -7650,7 +7650,7 @@
           <a:p>
             <a:fld id="{2320262B-2CF3-4F76-87D6-AD190785F2F6}" type="datetime1">
               <a:rPr lang="fr-CH" smtClean="0"/>
-              <a:t>20.01.2023</a:t>
+              <a:t>21.01.2023</a:t>
             </a:fld>
             <a:endParaRPr lang="fr-CH"/>
           </a:p>
@@ -7766,7 +7766,14 @@
           <a:p>
             <a:r>
               <a:rPr lang="fr-CH" dirty="0"/>
-              <a:t>Créer les fantômes</a:t>
+              <a:t>Créer les mouvements des fantômes (chacun a un mouvement différent)</a:t>
+            </a:r>
+            <a:br>
+              <a:rPr lang="fr-CH" dirty="0"/>
+            </a:br>
+            <a:r>
+              <a:rPr lang="fr-CH" dirty="0"/>
+              <a:t>Créer les fruits (points bonus) à manger</a:t>
             </a:r>
           </a:p>
         </p:txBody>
@@ -7794,7 +7801,7 @@
           <a:p>
             <a:fld id="{2320262B-2CF3-4F76-87D6-AD190785F2F6}" type="datetime1">
               <a:rPr lang="fr-CH" smtClean="0"/>
-              <a:t>20.01.2023</a:t>
+              <a:t>21.01.2023</a:t>
             </a:fld>
             <a:endParaRPr lang="fr-CH"/>
           </a:p>
@@ -7829,6 +7836,98 @@
           </a:p>
         </p:txBody>
       </p:sp>
+      <p:pic>
+        <p:nvPicPr>
+          <p:cNvPr id="6" name="Picture 12" descr="Pacman Ghosts | Pixel Art Maker">
+            <a:extLst>
+              <a:ext uri="{FF2B5EF4-FFF2-40B4-BE49-F238E27FC236}">
+                <a16:creationId xmlns:a16="http://schemas.microsoft.com/office/drawing/2014/main" id="{9DC912D1-FCE8-B84B-8ADD-B8D446D25C62}"/>
+              </a:ext>
+            </a:extLst>
+          </p:cNvPr>
+          <p:cNvPicPr>
+            <a:picLocks noChangeAspect="1" noChangeArrowheads="1"/>
+          </p:cNvPicPr>
+          <p:nvPr/>
+        </p:nvPicPr>
+        <p:blipFill>
+          <a:blip r:embed="rId2">
+            <a:extLst>
+              <a:ext uri="{28A0092B-C50C-407E-A947-70E740481C1C}">
+                <a14:useLocalDpi xmlns:a14="http://schemas.microsoft.com/office/drawing/2010/main" val="0"/>
+              </a:ext>
+            </a:extLst>
+          </a:blip>
+          <a:srcRect/>
+          <a:stretch>
+            <a:fillRect/>
+          </a:stretch>
+        </p:blipFill>
+        <p:spPr bwMode="auto">
+          <a:xfrm>
+            <a:off x="838200" y="4897768"/>
+            <a:ext cx="4529007" cy="1325563"/>
+          </a:xfrm>
+          <a:prstGeom prst="rect">
+            <a:avLst/>
+          </a:prstGeom>
+          <a:noFill/>
+          <a:extLst>
+            <a:ext uri="{909E8E84-426E-40DD-AFC4-6F175D3DCCD1}">
+              <a14:hiddenFill xmlns:a14="http://schemas.microsoft.com/office/drawing/2010/main">
+                <a:solidFill>
+                  <a:srgbClr val="FFFFFF"/>
+                </a:solidFill>
+              </a14:hiddenFill>
+            </a:ext>
+          </a:extLst>
+        </p:spPr>
+      </p:pic>
+      <p:pic>
+        <p:nvPicPr>
+          <p:cNvPr id="7" name="Picture 14" descr="7 Things You Didn't Know About Pac-Man On His 40th Birthday | Digital Trends">
+            <a:extLst>
+              <a:ext uri="{FF2B5EF4-FFF2-40B4-BE49-F238E27FC236}">
+                <a16:creationId xmlns:a16="http://schemas.microsoft.com/office/drawing/2014/main" id="{348573F9-561D-DC9F-395F-EB97735C2704}"/>
+              </a:ext>
+            </a:extLst>
+          </p:cNvPr>
+          <p:cNvPicPr>
+            <a:picLocks noChangeAspect="1" noChangeArrowheads="1"/>
+          </p:cNvPicPr>
+          <p:nvPr/>
+        </p:nvPicPr>
+        <p:blipFill rotWithShape="1">
+          <a:blip r:embed="rId3">
+            <a:extLst>
+              <a:ext uri="{28A0092B-C50C-407E-A947-70E740481C1C}">
+                <a14:useLocalDpi xmlns:a14="http://schemas.microsoft.com/office/drawing/2010/main" val="0"/>
+              </a:ext>
+            </a:extLst>
+          </a:blip>
+          <a:srcRect l="16762" t="21740"/>
+          <a:stretch/>
+        </p:blipFill>
+        <p:spPr bwMode="auto">
+          <a:xfrm>
+            <a:off x="5841547" y="5082401"/>
+            <a:ext cx="5512253" cy="1132470"/>
+          </a:xfrm>
+          <a:prstGeom prst="rect">
+            <a:avLst/>
+          </a:prstGeom>
+          <a:noFill/>
+          <a:extLst>
+            <a:ext uri="{909E8E84-426E-40DD-AFC4-6F175D3DCCD1}">
+              <a14:hiddenFill xmlns:a14="http://schemas.microsoft.com/office/drawing/2010/main">
+                <a:solidFill>
+                  <a:srgbClr val="FFFFFF"/>
+                </a:solidFill>
+              </a14:hiddenFill>
+            </a:ext>
+          </a:extLst>
+        </p:spPr>
+      </p:pic>
     </p:spTree>
     <p:extLst>
       <p:ext uri="{BB962C8B-B14F-4D97-AF65-F5344CB8AC3E}">
@@ -8232,7 +8331,7 @@
                 </a:spcAft>
                 <a:defRPr/>
               </a:pPr>
-              <a:t>1/20/2023</a:t>
+              <a:t>1/21/2023</a:t>
             </a:fld>
             <a:endParaRPr lang="en-US">
               <a:solidFill>
@@ -8428,7 +8527,7 @@
           <a:p>
             <a:fld id="{2320262B-2CF3-4F76-87D6-AD190785F2F6}" type="datetime1">
               <a:rPr lang="fr-CH" smtClean="0"/>
-              <a:t>20.01.2023</a:t>
+              <a:t>21.01.2023</a:t>
             </a:fld>
             <a:endParaRPr lang="fr-CH"/>
           </a:p>
@@ -8569,7 +8668,7 @@
           <a:p>
             <a:fld id="{2320262B-2CF3-4F76-87D6-AD190785F2F6}" type="datetime1">
               <a:rPr lang="fr-CH" smtClean="0"/>
-              <a:t>20.01.2023</a:t>
+              <a:t>21.01.2023</a:t>
             </a:fld>
             <a:endParaRPr lang="fr-CH"/>
           </a:p>
@@ -8626,8 +8725,8 @@
         </p:blipFill>
         <p:spPr>
           <a:xfrm>
-            <a:off x="2068481" y="1249491"/>
-            <a:ext cx="8055038" cy="4359018"/>
+            <a:off x="1257618" y="1119729"/>
+            <a:ext cx="9676763" cy="5236621"/>
           </a:xfrm>
           <a:prstGeom prst="rect">
             <a:avLst/>
@@ -8740,7 +8839,7 @@
           <a:p>
             <a:fld id="{2320262B-2CF3-4F76-87D6-AD190785F2F6}" type="datetime1">
               <a:rPr lang="fr-CH" smtClean="0"/>
-              <a:t>20.01.2023</a:t>
+              <a:t>21.01.2023</a:t>
             </a:fld>
             <a:endParaRPr lang="fr-CH"/>
           </a:p>
@@ -8797,8 +8896,8 @@
         </p:blipFill>
         <p:spPr>
           <a:xfrm>
-            <a:off x="2486510" y="1486554"/>
-            <a:ext cx="7218980" cy="4869796"/>
+            <a:off x="2152739" y="1036242"/>
+            <a:ext cx="7886522" cy="5320108"/>
           </a:xfrm>
           <a:prstGeom prst="rect">
             <a:avLst/>
@@ -8946,7 +9045,7 @@
           <a:p>
             <a:fld id="{2320262B-2CF3-4F76-87D6-AD190785F2F6}" type="datetime1">
               <a:rPr lang="fr-CH" smtClean="0"/>
-              <a:t>20.01.2023</a:t>
+              <a:t>21.01.2023</a:t>
             </a:fld>
             <a:endParaRPr lang="fr-CH"/>
           </a:p>
@@ -9120,7 +9219,7 @@
           <a:p>
             <a:fld id="{2320262B-2CF3-4F76-87D6-AD190785F2F6}" type="datetime1">
               <a:rPr lang="fr-CH" smtClean="0"/>
-              <a:t>20.01.2023</a:t>
+              <a:t>21.01.2023</a:t>
             </a:fld>
             <a:endParaRPr lang="fr-CH"/>
           </a:p>
@@ -9343,7 +9442,7 @@
           <a:p>
             <a:fld id="{2320262B-2CF3-4F76-87D6-AD190785F2F6}" type="datetime1">
               <a:rPr lang="fr-CH" smtClean="0"/>
-              <a:t>20.01.2023</a:t>
+              <a:t>21.01.2023</a:t>
             </a:fld>
             <a:endParaRPr lang="fr-CH"/>
           </a:p>
@@ -9540,7 +9639,7 @@
           <a:p>
             <a:fld id="{2320262B-2CF3-4F76-87D6-AD190785F2F6}" type="datetime1">
               <a:rPr lang="fr-CH" smtClean="0"/>
-              <a:t>20.01.2023</a:t>
+              <a:t>21.01.2023</a:t>
             </a:fld>
             <a:endParaRPr lang="fr-CH"/>
           </a:p>
@@ -9654,7 +9753,7 @@
           <a:bodyPr/>
           <a:lstStyle/>
           <a:p>
-            <a:endParaRPr lang="fr-CH"/>
+            <a:endParaRPr lang="fr-CH" dirty="0"/>
           </a:p>
         </p:txBody>
       </p:sp>
@@ -9681,7 +9780,7 @@
           <a:p>
             <a:fld id="{2320262B-2CF3-4F76-87D6-AD190785F2F6}" type="datetime1">
               <a:rPr lang="fr-CH" smtClean="0"/>
-              <a:t>20.01.2023</a:t>
+              <a:t>21.01.2023</a:t>
             </a:fld>
             <a:endParaRPr lang="fr-CH"/>
           </a:p>
@@ -9738,8 +9837,8 @@
         </p:blipFill>
         <p:spPr>
           <a:xfrm>
-            <a:off x="3123942" y="1973454"/>
-            <a:ext cx="5944115" cy="2911092"/>
+            <a:off x="1160207" y="1386933"/>
+            <a:ext cx="9056297" cy="4435263"/>
           </a:xfrm>
           <a:prstGeom prst="rect">
             <a:avLst/>
@@ -10645,12 +10744,6 @@
 </file>
 
 <file path=customXml/item1.xml><?xml version="1.0" encoding="utf-8"?>
-<p:properties xmlns:p="http://schemas.microsoft.com/office/2006/metadata/properties" xmlns:xsi="http://www.w3.org/2001/XMLSchema-instance" xmlns:pc="http://schemas.microsoft.com/office/infopath/2007/PartnerControls">
-  <documentManagement/>
-</p:properties>
-</file>
-
-<file path=customXml/item2.xml><?xml version="1.0" encoding="utf-8"?>
 <ct:contentTypeSchema xmlns:ct="http://schemas.microsoft.com/office/2006/metadata/contentType" xmlns:ma="http://schemas.microsoft.com/office/2006/metadata/properties/metaAttributes" ct:_="" ma:_="" ma:contentTypeName="Document" ma:contentTypeID="0x0101005B94F9D6F83AA740A438460002EA73B4" ma:contentTypeVersion="8" ma:contentTypeDescription="Crée un document." ma:contentTypeScope="" ma:versionID="867d7f2ab8515440b440ca9ac0f20371">
   <xsd:schema xmlns:xsd="http://www.w3.org/2001/XMLSchema" xmlns:xs="http://www.w3.org/2001/XMLSchema" xmlns:p="http://schemas.microsoft.com/office/2006/metadata/properties" xmlns:ns2="e33e2546-1508-41cf-a449-49e08907958b" targetNamespace="http://schemas.microsoft.com/office/2006/metadata/properties" ma:root="true" ma:fieldsID="d09a8d1b93543c53999e7e6b2ffdb266" ns2:_="">
     <xsd:import namespace="e33e2546-1508-41cf-a449-49e08907958b"/>
@@ -10820,6 +10913,12 @@
 </ct:contentTypeSchema>
 </file>
 
+<file path=customXml/item2.xml><?xml version="1.0" encoding="utf-8"?>
+<p:properties xmlns:p="http://schemas.microsoft.com/office/2006/metadata/properties" xmlns:xsi="http://www.w3.org/2001/XMLSchema-instance" xmlns:pc="http://schemas.microsoft.com/office/infopath/2007/PartnerControls">
+  <documentManagement/>
+</p:properties>
+</file>
+
 <file path=customXml/item3.xml><?xml version="1.0" encoding="utf-8"?>
 <?mso-contentType ?>
 <FormTemplates xmlns="http://schemas.microsoft.com/sharepoint/v3/contenttype/forms">
@@ -10830,22 +10929,6 @@
 </file>
 
 <file path=customXml/itemProps1.xml><?xml version="1.0" encoding="utf-8"?>
-<ds:datastoreItem xmlns:ds="http://schemas.openxmlformats.org/officeDocument/2006/customXml" ds:itemID="{B5974ACC-15C0-4FE6-B860-BBAD7E5B6D3D}">
-  <ds:schemaRefs>
-    <ds:schemaRef ds:uri="e33e2546-1508-41cf-a449-49e08907958b"/>
-    <ds:schemaRef ds:uri="http://purl.org/dc/dcmitype/"/>
-    <ds:schemaRef ds:uri="http://purl.org/dc/elements/1.1/"/>
-    <ds:schemaRef ds:uri="http://purl.org/dc/terms/"/>
-    <ds:schemaRef ds:uri="http://schemas.microsoft.com/office/2006/documentManagement/types"/>
-    <ds:schemaRef ds:uri="http://schemas.microsoft.com/office/2006/metadata/properties"/>
-    <ds:schemaRef ds:uri="http://schemas.microsoft.com/office/infopath/2007/PartnerControls"/>
-    <ds:schemaRef ds:uri="http://schemas.openxmlformats.org/package/2006/metadata/core-properties"/>
-    <ds:schemaRef ds:uri="http://www.w3.org/XML/1998/namespace"/>
-  </ds:schemaRefs>
-</ds:datastoreItem>
-</file>
-
-<file path=customXml/itemProps2.xml><?xml version="1.0" encoding="utf-8"?>
 <ds:datastoreItem xmlns:ds="http://schemas.openxmlformats.org/officeDocument/2006/customXml" ds:itemID="{42B24F42-DCE5-4DE5-97B4-8038FC9BBF09}">
   <ds:schemaRefs>
     <ds:schemaRef ds:uri="e33e2546-1508-41cf-a449-49e08907958b"/>
@@ -10863,6 +10946,22 @@
 </ds:datastoreItem>
 </file>
 
+<file path=customXml/itemProps2.xml><?xml version="1.0" encoding="utf-8"?>
+<ds:datastoreItem xmlns:ds="http://schemas.openxmlformats.org/officeDocument/2006/customXml" ds:itemID="{B5974ACC-15C0-4FE6-B860-BBAD7E5B6D3D}">
+  <ds:schemaRefs>
+    <ds:schemaRef ds:uri="e33e2546-1508-41cf-a449-49e08907958b"/>
+    <ds:schemaRef ds:uri="http://purl.org/dc/dcmitype/"/>
+    <ds:schemaRef ds:uri="http://purl.org/dc/elements/1.1/"/>
+    <ds:schemaRef ds:uri="http://purl.org/dc/terms/"/>
+    <ds:schemaRef ds:uri="http://schemas.microsoft.com/office/2006/documentManagement/types"/>
+    <ds:schemaRef ds:uri="http://schemas.microsoft.com/office/2006/metadata/properties"/>
+    <ds:schemaRef ds:uri="http://schemas.microsoft.com/office/infopath/2007/PartnerControls"/>
+    <ds:schemaRef ds:uri="http://schemas.openxmlformats.org/package/2006/metadata/core-properties"/>
+    <ds:schemaRef ds:uri="http://www.w3.org/XML/1998/namespace"/>
+  </ds:schemaRefs>
+</ds:datastoreItem>
+</file>
+
 <file path=customXml/itemProps3.xml><?xml version="1.0" encoding="utf-8"?>
 <ds:datastoreItem xmlns:ds="http://schemas.openxmlformats.org/officeDocument/2006/customXml" ds:itemID="{CF5227B9-31DB-4B4A-8829-83A4682F900D}">
   <ds:schemaRefs>

</xml_diff>